<commit_message>
Atualização power point 05-03
</commit_message>
<xml_diff>
--- a/projeto_apresentacao.pptx
+++ b/projeto_apresentacao.pptx
@@ -7,7 +7,7 @@
     <p:sldMasterId id="2147483876" r:id="rId3"/>
   </p:sldMasterIdLst>
   <p:notesMasterIdLst>
-    <p:notesMasterId r:id="rId11"/>
+    <p:notesMasterId r:id="rId12"/>
   </p:notesMasterIdLst>
   <p:sldIdLst>
     <p:sldId id="256" r:id="rId4"/>
@@ -17,6 +17,7 @@
     <p:sldId id="270" r:id="rId8"/>
     <p:sldId id="257" r:id="rId9"/>
     <p:sldId id="271" r:id="rId10"/>
+    <p:sldId id="272" r:id="rId11"/>
   </p:sldIdLst>
   <p:sldSz cx="12192000" cy="6858000"/>
   <p:notesSz cx="6858000" cy="9144000"/>
@@ -205,7 +206,7 @@
           <a:p>
             <a:fld id="{B05B69DD-B389-404D-A57F-F09D5DF35FA4}" type="datetimeFigureOut">
               <a:rPr lang="pt-BR" smtClean="0"/>
-              <a:t>04/03/2021</a:t>
+              <a:t>05/03/2021</a:t>
             </a:fld>
             <a:endParaRPr lang="pt-BR"/>
           </a:p>
@@ -635,7 +636,7 @@
             <a:fld id="{11A6662E-FAF4-44BC-88B5-85A7CBFB6D30}" type="datetime1">
               <a:rPr lang="en-US" smtClean="0"/>
               <a:pPr/>
-              <a:t>3/4/2021</a:t>
+              <a:t>3/5/2021</a:t>
             </a:fld>
             <a:endParaRPr lang="en-US" dirty="0"/>
           </a:p>
@@ -862,7 +863,7 @@
           <a:p>
             <a:fld id="{4C559632-1575-4E14-B53B-3DC3D5ED3947}" type="datetime1">
               <a:rPr lang="en-US" smtClean="0"/>
-              <a:t>3/4/2021</a:t>
+              <a:t>3/5/2021</a:t>
             </a:fld>
             <a:endParaRPr lang="en-US"/>
           </a:p>
@@ -1070,7 +1071,7 @@
           <a:p>
             <a:fld id="{CC4A6868-2568-4CC9-B302-F37117B01A6E}" type="datetime1">
               <a:rPr lang="en-US" smtClean="0"/>
-              <a:t>3/4/2021</a:t>
+              <a:t>3/5/2021</a:t>
             </a:fld>
             <a:endParaRPr lang="en-US"/>
           </a:p>
@@ -1450,7 +1451,7 @@
           <a:p>
             <a:fld id="{12241623-A064-4BED-B073-BA4D61433402}" type="datetime1">
               <a:rPr lang="en-US" smtClean="0"/>
-              <a:t>3/4/2021</a:t>
+              <a:t>3/5/2021</a:t>
             </a:fld>
             <a:endParaRPr lang="en-US" dirty="0"/>
           </a:p>
@@ -2261,7 +2262,7 @@
           <a:p>
             <a:fld id="{22F3E5F3-28EE-488F-BD53-B744C06C3DEC}" type="datetime1">
               <a:rPr lang="en-US" smtClean="0"/>
-              <a:t>3/4/2021</a:t>
+              <a:t>3/5/2021</a:t>
             </a:fld>
             <a:endParaRPr lang="en-US" dirty="0"/>
           </a:p>
@@ -4954,7 +4955,7 @@
           <a:p>
             <a:fld id="{E72EB70D-CD01-44DA-83B3-8FEB3383D307}" type="datetime1">
               <a:rPr lang="en-US" smtClean="0"/>
-              <a:t>3/4/2021</a:t>
+              <a:t>3/5/2021</a:t>
             </a:fld>
             <a:endParaRPr lang="en-US" dirty="0"/>
           </a:p>
@@ -5150,7 +5151,7 @@
           <a:p>
             <a:fld id="{D0158CFD-9357-46BE-A189-D637A67C8730}" type="datetime1">
               <a:rPr lang="en-US" smtClean="0"/>
-              <a:t>3/4/2021</a:t>
+              <a:t>3/5/2021</a:t>
             </a:fld>
             <a:endParaRPr lang="en-US" dirty="0"/>
           </a:p>
@@ -5539,7 +5540,7 @@
           <a:p>
             <a:fld id="{7B4742EE-B331-4632-BD10-A82FED6B6FC0}" type="datetime1">
               <a:rPr lang="en-US" smtClean="0"/>
-              <a:t>3/4/2021</a:t>
+              <a:t>3/5/2021</a:t>
             </a:fld>
             <a:endParaRPr lang="en-US" dirty="0"/>
           </a:p>
@@ -5705,7 +5706,7 @@
           <a:p>
             <a:fld id="{451BA835-D13F-49F4-8F11-5D576AC65FAD}" type="datetime1">
               <a:rPr lang="en-US" smtClean="0"/>
-              <a:t>3/4/2021</a:t>
+              <a:t>3/5/2021</a:t>
             </a:fld>
             <a:endParaRPr lang="en-US" dirty="0"/>
           </a:p>
@@ -5828,7 +5829,7 @@
           <a:p>
             <a:fld id="{ADBD1799-ACB5-4CB2-86A2-5C574F1C8706}" type="datetime1">
               <a:rPr lang="en-US" smtClean="0"/>
-              <a:t>3/4/2021</a:t>
+              <a:t>3/5/2021</a:t>
             </a:fld>
             <a:endParaRPr lang="en-US" dirty="0"/>
           </a:p>
@@ -6138,7 +6139,7 @@
           <a:p>
             <a:fld id="{ED5DD0D6-7A82-473E-879B-C6ECD6CCCFEC}" type="datetime1">
               <a:rPr lang="en-US" smtClean="0"/>
-              <a:t>3/4/2021</a:t>
+              <a:t>3/5/2021</a:t>
             </a:fld>
             <a:endParaRPr lang="en-US" dirty="0"/>
           </a:p>
@@ -6350,7 +6351,7 @@
           <a:p>
             <a:fld id="{0055F08A-1E71-4B2B-BB49-E743F2903911}" type="datetime1">
               <a:rPr lang="en-US" smtClean="0"/>
-              <a:t>3/4/2021</a:t>
+              <a:t>3/5/2021</a:t>
             </a:fld>
             <a:endParaRPr lang="en-US" dirty="0"/>
           </a:p>
@@ -6643,7 +6644,7 @@
           <a:p>
             <a:fld id="{D4605E03-BC17-41A7-854C-DFAB672737DC}" type="datetime1">
               <a:rPr lang="en-US" smtClean="0"/>
-              <a:t>3/4/2021</a:t>
+              <a:t>3/5/2021</a:t>
             </a:fld>
             <a:endParaRPr lang="en-US" dirty="0"/>
           </a:p>
@@ -6853,7 +6854,7 @@
           <a:p>
             <a:fld id="{6F86ED0C-1DA7-41F0-94CF-6218B1FEDFF1}" type="datetime1">
               <a:rPr lang="en-US" smtClean="0"/>
-              <a:t>3/4/2021</a:t>
+              <a:t>3/5/2021</a:t>
             </a:fld>
             <a:endParaRPr lang="en-US" dirty="0"/>
           </a:p>
@@ -7052,7 +7053,7 @@
           <a:p>
             <a:fld id="{EECF02AB-6034-4B88-BC5A-7C17CB0EF809}" type="datetime1">
               <a:rPr lang="en-US" smtClean="0"/>
-              <a:t>3/4/2021</a:t>
+              <a:t>3/5/2021</a:t>
             </a:fld>
             <a:endParaRPr lang="en-US" dirty="0"/>
           </a:p>
@@ -11066,7 +11067,7 @@
           <a:p>
             <a:fld id="{15417D9E-721A-44BB-8863-9873FE64DA75}" type="datetime1">
               <a:rPr lang="en-US" smtClean="0"/>
-              <a:t>3/4/2021</a:t>
+              <a:t>3/5/2021</a:t>
             </a:fld>
             <a:endParaRPr lang="en-US"/>
           </a:p>
@@ -13483,7 +13484,7 @@
           <a:p>
             <a:fld id="{5F31DA2F-80B8-49CF-99FB-5ABCA53A607A}" type="datetime1">
               <a:rPr lang="en-US" smtClean="0"/>
-              <a:t>3/4/2021</a:t>
+              <a:t>3/5/2021</a:t>
             </a:fld>
             <a:endParaRPr lang="en-US"/>
           </a:p>
@@ -13898,7 +13899,7 @@
           <a:p>
             <a:fld id="{28852172-E6C9-4B6C-929A-A9DE3837BBF1}" type="datetime1">
               <a:rPr lang="en-US" smtClean="0"/>
-              <a:t>3/4/2021</a:t>
+              <a:t>3/5/2021</a:t>
             </a:fld>
             <a:endParaRPr lang="en-US"/>
           </a:p>
@@ -14050,7 +14051,7 @@
           <a:p>
             <a:fld id="{3AB41CFF-90C9-47B3-9DA1-F2BF8D839F7E}" type="datetime1">
               <a:rPr lang="en-US" smtClean="0"/>
-              <a:t>3/4/2021</a:t>
+              <a:t>3/5/2021</a:t>
             </a:fld>
             <a:endParaRPr lang="en-US"/>
           </a:p>
@@ -14163,7 +14164,7 @@
           <a:p>
             <a:fld id="{F06048FA-06AB-4884-A69B-986B96E68A24}" type="datetime1">
               <a:rPr lang="en-US" smtClean="0"/>
-              <a:t>3/4/2021</a:t>
+              <a:t>3/5/2021</a:t>
             </a:fld>
             <a:endParaRPr lang="en-US"/>
           </a:p>
@@ -14474,7 +14475,7 @@
           <a:p>
             <a:fld id="{50DB7ABA-0172-4F9C-889D-567164F66BCD}" type="datetime1">
               <a:rPr lang="en-US" smtClean="0"/>
-              <a:t>3/4/2021</a:t>
+              <a:t>3/5/2021</a:t>
             </a:fld>
             <a:endParaRPr lang="en-US"/>
           </a:p>
@@ -14765,7 +14766,7 @@
           <a:p>
             <a:fld id="{78AC6A5B-8AE7-4A41-B5A7-9ADC6686DC18}" type="datetime1">
               <a:rPr lang="en-US" smtClean="0"/>
-              <a:t>3/4/2021</a:t>
+              <a:t>3/5/2021</a:t>
             </a:fld>
             <a:endParaRPr lang="en-US"/>
           </a:p>
@@ -15074,7 +15075,7 @@
             <a:fld id="{57E0CF6C-748E-4B7A-BC8B-3011EF78ED13}" type="datetime1">
               <a:rPr lang="en-US" smtClean="0"/>
               <a:pPr/>
-              <a:t>3/4/2021</a:t>
+              <a:t>3/5/2021</a:t>
             </a:fld>
             <a:endParaRPr lang="en-US" dirty="0"/>
           </a:p>
@@ -15693,7 +15694,7 @@
           <a:p>
             <a:fld id="{C4408324-A84C-4A45-93B6-78D079CCE772}" type="datetime1">
               <a:rPr lang="en-US" smtClean="0"/>
-              <a:t>3/4/2021</a:t>
+              <a:t>3/5/2021</a:t>
             </a:fld>
             <a:endParaRPr lang="en-US" dirty="0"/>
           </a:p>
@@ -16941,56 +16942,6 @@
           </a:extLst>
         </p:spPr>
       </p:pic>
-      <p:sp>
-        <p:nvSpPr>
-          <p:cNvPr id="30" name="Subtítulo 2">
-            <a:extLst>
-              <a:ext uri="{FF2B5EF4-FFF2-40B4-BE49-F238E27FC236}">
-                <a16:creationId xmlns:a16="http://schemas.microsoft.com/office/drawing/2014/main" id="{11102E96-60F7-4D6C-A4DE-7B767293C5CF}"/>
-              </a:ext>
-            </a:extLst>
-          </p:cNvPr>
-          <p:cNvSpPr>
-            <a:spLocks noGrp="1"/>
-          </p:cNvSpPr>
-          <p:nvPr>
-            <p:ph type="subTitle" idx="1"/>
-          </p:nvPr>
-        </p:nvSpPr>
-        <p:spPr>
-          <a:xfrm>
-            <a:off x="433856" y="5545769"/>
-            <a:ext cx="4787500" cy="575729"/>
-          </a:xfrm>
-        </p:spPr>
-        <p:txBody>
-          <a:bodyPr vert="horz" lIns="91440" tIns="45720" rIns="91440" bIns="45720" rtlCol="0">
-            <a:noAutofit/>
-          </a:bodyPr>
-          <a:lstStyle/>
-          <a:p>
-            <a:pPr algn="l">
-              <a:spcBef>
-                <a:spcPct val="0"/>
-              </a:spcBef>
-              <a:spcAft>
-                <a:spcPts val="600"/>
-              </a:spcAft>
-            </a:pPr>
-            <a:r>
-              <a:rPr lang="pt-BR" sz="2400" dirty="0">
-                <a:solidFill>
-                  <a:srgbClr val="FFFFFF"/>
-                </a:solidFill>
-                <a:latin typeface="Arial Rounded MT Bold" panose="020F0704030504030204" pitchFamily="34" charset="0"/>
-                <a:ea typeface="+mj-ea"/>
-                <a:cs typeface="+mj-cs"/>
-              </a:rPr>
-              <a:t>Beatriz, Elizeu, Fernando, Giovanna, Guilherme e Ricardo </a:t>
-            </a:r>
-          </a:p>
-        </p:txBody>
-      </p:sp>
       <p:pic>
         <p:nvPicPr>
           <p:cNvPr id="3" name="Imagem 2" descr="Logotipo&#10;&#10;Descrição gerada automaticamente">
@@ -17027,6 +16978,243 @@
           </a:prstGeom>
         </p:spPr>
       </p:pic>
+      <p:sp>
+        <p:nvSpPr>
+          <p:cNvPr id="9" name="Subtítulo 2">
+            <a:extLst>
+              <a:ext uri="{FF2B5EF4-FFF2-40B4-BE49-F238E27FC236}">
+                <a16:creationId xmlns:a16="http://schemas.microsoft.com/office/drawing/2014/main" id="{17B4E1C7-0593-4DB4-9D93-4814823A0125}"/>
+              </a:ext>
+            </a:extLst>
+          </p:cNvPr>
+          <p:cNvSpPr txBox="1">
+            <a:spLocks/>
+          </p:cNvSpPr>
+          <p:nvPr/>
+        </p:nvSpPr>
+        <p:spPr>
+          <a:xfrm>
+            <a:off x="433856" y="5545769"/>
+            <a:ext cx="4787500" cy="575729"/>
+          </a:xfrm>
+          <a:prstGeom prst="rect">
+            <a:avLst/>
+          </a:prstGeom>
+        </p:spPr>
+        <p:txBody>
+          <a:bodyPr vert="horz" lIns="91440" tIns="45720" rIns="91440" bIns="45720" rtlCol="0">
+            <a:noAutofit/>
+          </a:bodyPr>
+          <a:lstStyle>
+            <a:lvl1pPr marL="0" indent="0" algn="ctr" defTabSz="914400" rtl="0" eaLnBrk="1" latinLnBrk="0" hangingPunct="1">
+              <a:lnSpc>
+                <a:spcPct val="110000"/>
+              </a:lnSpc>
+              <a:spcBef>
+                <a:spcPts val="1000"/>
+              </a:spcBef>
+              <a:buClr>
+                <a:schemeClr val="accent1"/>
+              </a:buClr>
+              <a:buFont typeface="Arial" panose="020B0604020202020204" pitchFamily="34" charset="0"/>
+              <a:buNone/>
+              <a:defRPr sz="2000" kern="1200">
+                <a:solidFill>
+                  <a:schemeClr val="tx1"/>
+                </a:solidFill>
+                <a:latin typeface="+mn-lt"/>
+                <a:ea typeface="+mn-ea"/>
+                <a:cs typeface="+mn-cs"/>
+              </a:defRPr>
+            </a:lvl1pPr>
+            <a:lvl2pPr marL="457200" indent="0" algn="ctr" defTabSz="914400" rtl="0" eaLnBrk="1" latinLnBrk="0" hangingPunct="1">
+              <a:lnSpc>
+                <a:spcPct val="110000"/>
+              </a:lnSpc>
+              <a:spcBef>
+                <a:spcPts val="500"/>
+              </a:spcBef>
+              <a:buClr>
+                <a:schemeClr val="accent1"/>
+              </a:buClr>
+              <a:buFont typeface="Arial" panose="020B0604020202020204" pitchFamily="34" charset="0"/>
+              <a:buNone/>
+              <a:defRPr sz="2000" kern="1200">
+                <a:solidFill>
+                  <a:schemeClr val="tx1"/>
+                </a:solidFill>
+                <a:latin typeface="+mn-lt"/>
+                <a:ea typeface="+mn-ea"/>
+                <a:cs typeface="+mn-cs"/>
+              </a:defRPr>
+            </a:lvl2pPr>
+            <a:lvl3pPr marL="914400" indent="0" algn="ctr" defTabSz="914400" rtl="0" eaLnBrk="1" latinLnBrk="0" hangingPunct="1">
+              <a:lnSpc>
+                <a:spcPct val="110000"/>
+              </a:lnSpc>
+              <a:spcBef>
+                <a:spcPts val="500"/>
+              </a:spcBef>
+              <a:buClr>
+                <a:schemeClr val="accent1"/>
+              </a:buClr>
+              <a:buFont typeface="Arial" panose="020B0604020202020204" pitchFamily="34" charset="0"/>
+              <a:buNone/>
+              <a:defRPr sz="1800" kern="1200">
+                <a:solidFill>
+                  <a:schemeClr val="tx1"/>
+                </a:solidFill>
+                <a:latin typeface="+mn-lt"/>
+                <a:ea typeface="+mn-ea"/>
+                <a:cs typeface="+mn-cs"/>
+              </a:defRPr>
+            </a:lvl3pPr>
+            <a:lvl4pPr marL="1371600" indent="0" algn="ctr" defTabSz="914400" rtl="0" eaLnBrk="1" latinLnBrk="0" hangingPunct="1">
+              <a:lnSpc>
+                <a:spcPct val="110000"/>
+              </a:lnSpc>
+              <a:spcBef>
+                <a:spcPts val="500"/>
+              </a:spcBef>
+              <a:buClr>
+                <a:schemeClr val="accent1"/>
+              </a:buClr>
+              <a:buFont typeface="Arial" panose="020B0604020202020204" pitchFamily="34" charset="0"/>
+              <a:buNone/>
+              <a:defRPr sz="1600" kern="1200">
+                <a:solidFill>
+                  <a:schemeClr val="tx1"/>
+                </a:solidFill>
+                <a:latin typeface="+mn-lt"/>
+                <a:ea typeface="+mn-ea"/>
+                <a:cs typeface="+mn-cs"/>
+              </a:defRPr>
+            </a:lvl4pPr>
+            <a:lvl5pPr marL="1828800" indent="0" algn="ctr" defTabSz="914400" rtl="0" eaLnBrk="1" latinLnBrk="0" hangingPunct="1">
+              <a:lnSpc>
+                <a:spcPct val="110000"/>
+              </a:lnSpc>
+              <a:spcBef>
+                <a:spcPts val="500"/>
+              </a:spcBef>
+              <a:buClr>
+                <a:schemeClr val="accent1"/>
+              </a:buClr>
+              <a:buFont typeface="Arial" panose="020B0604020202020204" pitchFamily="34" charset="0"/>
+              <a:buNone/>
+              <a:defRPr sz="1600" kern="1200">
+                <a:solidFill>
+                  <a:schemeClr val="tx1"/>
+                </a:solidFill>
+                <a:latin typeface="+mn-lt"/>
+                <a:ea typeface="+mn-ea"/>
+                <a:cs typeface="+mn-cs"/>
+              </a:defRPr>
+            </a:lvl5pPr>
+            <a:lvl6pPr marL="2286000" indent="0" algn="ctr" defTabSz="914400" rtl="0" eaLnBrk="1" latinLnBrk="0" hangingPunct="1">
+              <a:lnSpc>
+                <a:spcPct val="90000"/>
+              </a:lnSpc>
+              <a:spcBef>
+                <a:spcPts val="500"/>
+              </a:spcBef>
+              <a:buFont typeface="Arial" panose="020B0604020202020204" pitchFamily="34" charset="0"/>
+              <a:buNone/>
+              <a:defRPr sz="1600" kern="1200">
+                <a:solidFill>
+                  <a:schemeClr val="tx1"/>
+                </a:solidFill>
+                <a:latin typeface="+mn-lt"/>
+                <a:ea typeface="+mn-ea"/>
+                <a:cs typeface="+mn-cs"/>
+              </a:defRPr>
+            </a:lvl6pPr>
+            <a:lvl7pPr marL="2743200" indent="0" algn="ctr" defTabSz="914400" rtl="0" eaLnBrk="1" latinLnBrk="0" hangingPunct="1">
+              <a:lnSpc>
+                <a:spcPct val="90000"/>
+              </a:lnSpc>
+              <a:spcBef>
+                <a:spcPts val="500"/>
+              </a:spcBef>
+              <a:buFont typeface="Arial" panose="020B0604020202020204" pitchFamily="34" charset="0"/>
+              <a:buNone/>
+              <a:defRPr sz="1600" kern="1200">
+                <a:solidFill>
+                  <a:schemeClr val="tx1"/>
+                </a:solidFill>
+                <a:latin typeface="+mn-lt"/>
+                <a:ea typeface="+mn-ea"/>
+                <a:cs typeface="+mn-cs"/>
+              </a:defRPr>
+            </a:lvl7pPr>
+            <a:lvl8pPr marL="3200400" indent="0" algn="ctr" defTabSz="914400" rtl="0" eaLnBrk="1" latinLnBrk="0" hangingPunct="1">
+              <a:lnSpc>
+                <a:spcPct val="90000"/>
+              </a:lnSpc>
+              <a:spcBef>
+                <a:spcPts val="500"/>
+              </a:spcBef>
+              <a:buFont typeface="Arial" panose="020B0604020202020204" pitchFamily="34" charset="0"/>
+              <a:buNone/>
+              <a:defRPr sz="1600" kern="1200">
+                <a:solidFill>
+                  <a:schemeClr val="tx1"/>
+                </a:solidFill>
+                <a:latin typeface="+mn-lt"/>
+                <a:ea typeface="+mn-ea"/>
+                <a:cs typeface="+mn-cs"/>
+              </a:defRPr>
+            </a:lvl8pPr>
+            <a:lvl9pPr marL="3657600" indent="0" algn="ctr" defTabSz="914400" rtl="0" eaLnBrk="1" latinLnBrk="0" hangingPunct="1">
+              <a:lnSpc>
+                <a:spcPct val="90000"/>
+              </a:lnSpc>
+              <a:spcBef>
+                <a:spcPts val="500"/>
+              </a:spcBef>
+              <a:buFont typeface="Arial" panose="020B0604020202020204" pitchFamily="34" charset="0"/>
+              <a:buNone/>
+              <a:defRPr sz="1600" kern="1200">
+                <a:solidFill>
+                  <a:schemeClr val="tx1"/>
+                </a:solidFill>
+                <a:latin typeface="+mn-lt"/>
+                <a:ea typeface="+mn-ea"/>
+                <a:cs typeface="+mn-cs"/>
+              </a:defRPr>
+            </a:lvl9pPr>
+          </a:lstStyle>
+          <a:p>
+            <a:pPr algn="l">
+              <a:spcBef>
+                <a:spcPct val="0"/>
+              </a:spcBef>
+              <a:spcAft>
+                <a:spcPts val="600"/>
+              </a:spcAft>
+            </a:pPr>
+            <a:r>
+              <a:rPr lang="pt-BR" sz="2400">
+                <a:solidFill>
+                  <a:srgbClr val="FFFFFF"/>
+                </a:solidFill>
+                <a:latin typeface="Arial Rounded MT Bold" panose="020F0704030504030204" pitchFamily="34" charset="0"/>
+                <a:ea typeface="+mj-ea"/>
+                <a:cs typeface="+mj-cs"/>
+              </a:rPr>
+              <a:t>Beatriz, Elizeu, Fernando, Giovanna, Guilherme e Ricardo </a:t>
+            </a:r>
+            <a:endParaRPr lang="pt-BR" sz="2400" dirty="0">
+              <a:solidFill>
+                <a:srgbClr val="FFFFFF"/>
+              </a:solidFill>
+              <a:latin typeface="Arial Rounded MT Bold" panose="020F0704030504030204" pitchFamily="34" charset="0"/>
+              <a:ea typeface="+mj-ea"/>
+              <a:cs typeface="+mj-cs"/>
+            </a:endParaRPr>
+          </a:p>
+        </p:txBody>
+      </p:sp>
     </p:spTree>
     <p:extLst>
       <p:ext uri="{BB962C8B-B14F-4D97-AF65-F5344CB8AC3E}">
@@ -17073,7 +17261,7 @@
                             </p:stCondLst>
                             <p:childTnLst>
                               <p:par>
-                                <p:cTn id="5" presetID="42" presetClass="entr" presetSubtype="0" fill="hold" grpId="0" nodeType="afterEffect">
+                                <p:cTn id="5" presetID="42" presetClass="entr" presetSubtype="0" fill="hold" nodeType="afterEffect">
                                   <p:stCondLst>
                                     <p:cond delay="0"/>
                                   </p:stCondLst>
@@ -17086,7 +17274,97 @@
                                           </p:stCondLst>
                                         </p:cTn>
                                         <p:tgtEl>
-                                          <p:spTgt spid="30">
+                                          <p:spTgt spid="3"/>
+                                        </p:tgtEl>
+                                        <p:attrNameLst>
+                                          <p:attrName>style.visibility</p:attrName>
+                                        </p:attrNameLst>
+                                      </p:cBhvr>
+                                      <p:to>
+                                        <p:strVal val="visible"/>
+                                      </p:to>
+                                    </p:set>
+                                    <p:animEffect transition="in" filter="fade">
+                                      <p:cBhvr>
+                                        <p:cTn id="7" dur="1000"/>
+                                        <p:tgtEl>
+                                          <p:spTgt spid="3"/>
+                                        </p:tgtEl>
+                                      </p:cBhvr>
+                                    </p:animEffect>
+                                    <p:anim calcmode="lin" valueType="num">
+                                      <p:cBhvr>
+                                        <p:cTn id="8" dur="1000" fill="hold"/>
+                                        <p:tgtEl>
+                                          <p:spTgt spid="3"/>
+                                        </p:tgtEl>
+                                        <p:attrNameLst>
+                                          <p:attrName>ppt_x</p:attrName>
+                                        </p:attrNameLst>
+                                      </p:cBhvr>
+                                      <p:tavLst>
+                                        <p:tav tm="0">
+                                          <p:val>
+                                            <p:strVal val="#ppt_x"/>
+                                          </p:val>
+                                        </p:tav>
+                                        <p:tav tm="100000">
+                                          <p:val>
+                                            <p:strVal val="#ppt_x"/>
+                                          </p:val>
+                                        </p:tav>
+                                      </p:tavLst>
+                                    </p:anim>
+                                    <p:anim calcmode="lin" valueType="num">
+                                      <p:cBhvr>
+                                        <p:cTn id="9" dur="1000" fill="hold"/>
+                                        <p:tgtEl>
+                                          <p:spTgt spid="3"/>
+                                        </p:tgtEl>
+                                        <p:attrNameLst>
+                                          <p:attrName>ppt_y</p:attrName>
+                                        </p:attrNameLst>
+                                      </p:cBhvr>
+                                      <p:tavLst>
+                                        <p:tav tm="0">
+                                          <p:val>
+                                            <p:strVal val="#ppt_y+.1"/>
+                                          </p:val>
+                                        </p:tav>
+                                        <p:tav tm="100000">
+                                          <p:val>
+                                            <p:strVal val="#ppt_y"/>
+                                          </p:val>
+                                        </p:tav>
+                                      </p:tavLst>
+                                    </p:anim>
+                                  </p:childTnLst>
+                                </p:cTn>
+                              </p:par>
+                            </p:childTnLst>
+                          </p:cTn>
+                        </p:par>
+                        <p:par>
+                          <p:cTn id="10" fill="hold">
+                            <p:stCondLst>
+                              <p:cond delay="1000"/>
+                            </p:stCondLst>
+                            <p:childTnLst>
+                              <p:par>
+                                <p:cTn id="11" presetID="42" presetClass="entr" presetSubtype="0" fill="hold" grpId="0" nodeType="afterEffect">
+                                  <p:stCondLst>
+                                    <p:cond delay="0"/>
+                                  </p:stCondLst>
+                                  <p:childTnLst>
+                                    <p:set>
+                                      <p:cBhvr>
+                                        <p:cTn id="12" dur="1" fill="hold">
+                                          <p:stCondLst>
+                                            <p:cond delay="0"/>
+                                          </p:stCondLst>
+                                        </p:cTn>
+                                        <p:tgtEl>
+                                          <p:spTgt spid="9">
                                             <p:txEl>
                                               <p:pRg st="0" end="0"/>
                                             </p:txEl>
@@ -17102,9 +17380,9 @@
                                     </p:set>
                                     <p:animEffect transition="in" filter="fade">
                                       <p:cBhvr>
-                                        <p:cTn id="7" dur="1000"/>
+                                        <p:cTn id="13" dur="1000"/>
                                         <p:tgtEl>
-                                          <p:spTgt spid="30">
+                                          <p:spTgt spid="9">
                                             <p:txEl>
                                               <p:pRg st="0" end="0"/>
                                             </p:txEl>
@@ -17114,9 +17392,9 @@
                                     </p:animEffect>
                                     <p:anim calcmode="lin" valueType="num">
                                       <p:cBhvr>
-                                        <p:cTn id="8" dur="1000" fill="hold"/>
+                                        <p:cTn id="14" dur="1000" fill="hold"/>
                                         <p:tgtEl>
-                                          <p:spTgt spid="30">
+                                          <p:spTgt spid="9">
                                             <p:txEl>
                                               <p:pRg st="0" end="0"/>
                                             </p:txEl>
@@ -17141,9 +17419,9 @@
                                     </p:anim>
                                     <p:anim calcmode="lin" valueType="num">
                                       <p:cBhvr>
-                                        <p:cTn id="9" dur="1000" fill="hold"/>
+                                        <p:cTn id="15" dur="1000" fill="hold"/>
                                         <p:tgtEl>
-                                          <p:spTgt spid="30">
+                                          <p:spTgt spid="9">
                                             <p:txEl>
                                               <p:pRg st="0" end="0"/>
                                             </p:txEl>
@@ -17197,7 +17475,7 @@
       </p:par>
     </p:tnLst>
     <p:bldLst>
-      <p:bldP spid="30" grpId="0" build="p"/>
+      <p:bldP spid="9" grpId="0" build="p"/>
     </p:bldLst>
   </p:timing>
 </p:sld>
@@ -23844,13 +24122,13 @@
   <p:clrMapOvr>
     <a:masterClrMapping/>
   </p:clrMapOvr>
-  <mc:AlternateContent xmlns:mc="http://schemas.openxmlformats.org/markup-compatibility/2006">
-    <mc:Choice xmlns:p14="http://schemas.microsoft.com/office/powerpoint/2010/main" Requires="p14">
+  <mc:AlternateContent xmlns:mc="http://schemas.openxmlformats.org/markup-compatibility/2006" xmlns:p14="http://schemas.microsoft.com/office/powerpoint/2010/main">
+    <mc:Choice Requires="p14">
       <p:transition spd="slow" p14:dur="3400">
         <p14:reveal/>
       </p:transition>
     </mc:Choice>
-    <mc:Fallback>
+    <mc:Fallback xmlns="">
       <p:transition spd="slow">
         <p:fade/>
       </p:transition>
@@ -24489,13 +24767,13 @@
   <p:clrMapOvr>
     <a:masterClrMapping/>
   </p:clrMapOvr>
-  <mc:AlternateContent xmlns:mc="http://schemas.openxmlformats.org/markup-compatibility/2006">
-    <mc:Choice xmlns:p14="http://schemas.microsoft.com/office/powerpoint/2010/main" Requires="p14">
+  <mc:AlternateContent xmlns:mc="http://schemas.openxmlformats.org/markup-compatibility/2006" xmlns:p14="http://schemas.microsoft.com/office/powerpoint/2010/main">
+    <mc:Choice Requires="p14">
       <p:transition p14:dur="100">
         <p:cut/>
       </p:transition>
     </mc:Choice>
-    <mc:Fallback>
+    <mc:Fallback xmlns="">
       <p:transition>
         <p:cut/>
       </p:transition>
@@ -25401,13 +25679,13 @@
   <p:clrMapOvr>
     <a:masterClrMapping/>
   </p:clrMapOvr>
-  <mc:AlternateContent xmlns:mc="http://schemas.openxmlformats.org/markup-compatibility/2006">
-    <mc:Choice xmlns:p14="http://schemas.microsoft.com/office/powerpoint/2010/main" Requires="p14">
+  <mc:AlternateContent xmlns:mc="http://schemas.openxmlformats.org/markup-compatibility/2006" xmlns:p14="http://schemas.microsoft.com/office/powerpoint/2010/main">
+    <mc:Choice Requires="p14">
       <p:transition spd="slow" p14:dur="800">
         <p:circle/>
       </p:transition>
     </mc:Choice>
-    <mc:Fallback>
+    <mc:Fallback xmlns="">
       <p:transition spd="slow">
         <p:circle/>
       </p:transition>
@@ -25536,6 +25814,665 @@
         </p:cTn>
       </p:par>
     </p:tnLst>
+  </p:timing>
+</p:sld>
+</file>
+
+<file path=ppt/slides/slide8.xml><?xml version="1.0" encoding="utf-8"?>
+<p:sld xmlns:a="http://schemas.openxmlformats.org/drawingml/2006/main" xmlns:r="http://schemas.openxmlformats.org/officeDocument/2006/relationships" xmlns:p="http://schemas.openxmlformats.org/presentationml/2006/main">
+  <p:cSld>
+    <p:spTree>
+      <p:nvGrpSpPr>
+        <p:cNvPr id="1" name=""/>
+        <p:cNvGrpSpPr/>
+        <p:nvPr/>
+      </p:nvGrpSpPr>
+      <p:grpSpPr>
+        <a:xfrm>
+          <a:off x="0" y="0"/>
+          <a:ext cx="0" cy="0"/>
+          <a:chOff x="0" y="0"/>
+          <a:chExt cx="0" cy="0"/>
+        </a:xfrm>
+      </p:grpSpPr>
+      <p:sp>
+        <p:nvSpPr>
+          <p:cNvPr id="7" name="Retângulo 6">
+            <a:extLst>
+              <a:ext uri="{FF2B5EF4-FFF2-40B4-BE49-F238E27FC236}">
+                <a16:creationId xmlns:a16="http://schemas.microsoft.com/office/drawing/2014/main" id="{D7C42446-265D-4FE4-8291-2CA75685749D}"/>
+              </a:ext>
+            </a:extLst>
+          </p:cNvPr>
+          <p:cNvSpPr/>
+          <p:nvPr/>
+        </p:nvSpPr>
+        <p:spPr>
+          <a:xfrm>
+            <a:off x="0" y="0"/>
+            <a:ext cx="12192000" cy="6858000"/>
+          </a:xfrm>
+          <a:prstGeom prst="rect">
+            <a:avLst/>
+          </a:prstGeom>
+          <a:solidFill>
+            <a:srgbClr val="08032F"/>
+          </a:solidFill>
+        </p:spPr>
+        <p:style>
+          <a:lnRef idx="2">
+            <a:schemeClr val="accent1">
+              <a:shade val="50000"/>
+            </a:schemeClr>
+          </a:lnRef>
+          <a:fillRef idx="1">
+            <a:schemeClr val="accent1"/>
+          </a:fillRef>
+          <a:effectRef idx="0">
+            <a:schemeClr val="accent1"/>
+          </a:effectRef>
+          <a:fontRef idx="minor">
+            <a:schemeClr val="lt1"/>
+          </a:fontRef>
+        </p:style>
+        <p:txBody>
+          <a:bodyPr rtlCol="0" anchor="ctr"/>
+          <a:lstStyle/>
+          <a:p>
+            <a:pPr algn="ctr"/>
+            <a:endParaRPr lang="pt-BR"/>
+          </a:p>
+        </p:txBody>
+      </p:sp>
+      <p:sp>
+        <p:nvSpPr>
+          <p:cNvPr id="8" name="Retângulo 7">
+            <a:extLst>
+              <a:ext uri="{FF2B5EF4-FFF2-40B4-BE49-F238E27FC236}">
+                <a16:creationId xmlns:a16="http://schemas.microsoft.com/office/drawing/2014/main" id="{9DD06BDD-9ECB-4EF3-ABEF-C5E3E9425D4B}"/>
+              </a:ext>
+            </a:extLst>
+          </p:cNvPr>
+          <p:cNvSpPr/>
+          <p:nvPr/>
+        </p:nvSpPr>
+        <p:spPr>
+          <a:xfrm>
+            <a:off x="0" y="4473526"/>
+            <a:ext cx="12192000" cy="2384474"/>
+          </a:xfrm>
+          <a:prstGeom prst="rect">
+            <a:avLst/>
+          </a:prstGeom>
+          <a:solidFill>
+            <a:srgbClr val="FFFFFF"/>
+          </a:solidFill>
+          <a:ln>
+            <a:noFill/>
+          </a:ln>
+        </p:spPr>
+        <p:style>
+          <a:lnRef idx="2">
+            <a:schemeClr val="accent1">
+              <a:shade val="50000"/>
+            </a:schemeClr>
+          </a:lnRef>
+          <a:fillRef idx="1">
+            <a:schemeClr val="accent1"/>
+          </a:fillRef>
+          <a:effectRef idx="0">
+            <a:schemeClr val="accent1"/>
+          </a:effectRef>
+          <a:fontRef idx="minor">
+            <a:schemeClr val="lt1"/>
+          </a:fontRef>
+        </p:style>
+        <p:txBody>
+          <a:bodyPr rtlCol="0" anchor="ctr"/>
+          <a:lstStyle/>
+          <a:p>
+            <a:pPr algn="ctr"/>
+            <a:endParaRPr lang="pt-BR"/>
+          </a:p>
+        </p:txBody>
+      </p:sp>
+      <p:pic>
+        <p:nvPicPr>
+          <p:cNvPr id="16" name="Picture 2" descr="12 ideias para te inspirar a usar tecnologia na Educação em 2018">
+            <a:extLst>
+              <a:ext uri="{FF2B5EF4-FFF2-40B4-BE49-F238E27FC236}">
+                <a16:creationId xmlns:a16="http://schemas.microsoft.com/office/drawing/2014/main" id="{087772AE-64D5-440C-83F4-3EF9922125A0}"/>
+              </a:ext>
+            </a:extLst>
+          </p:cNvPr>
+          <p:cNvPicPr>
+            <a:picLocks noChangeAspect="1" noChangeArrowheads="1"/>
+          </p:cNvPicPr>
+          <p:nvPr/>
+        </p:nvPicPr>
+        <p:blipFill rotWithShape="1">
+          <a:blip r:embed="rId2">
+            <a:alphaModFix amt="17000"/>
+            <a:extLst>
+              <a:ext uri="{28A0092B-C50C-407E-A947-70E740481C1C}">
+                <a14:useLocalDpi xmlns:a14="http://schemas.microsoft.com/office/drawing/2010/main" val="0"/>
+              </a:ext>
+            </a:extLst>
+          </a:blip>
+          <a:srcRect l="7537" r="-1" b="-1"/>
+          <a:stretch/>
+        </p:blipFill>
+        <p:spPr bwMode="auto">
+          <a:xfrm>
+            <a:off x="20" y="1386"/>
+            <a:ext cx="12191980" cy="6856614"/>
+          </a:xfrm>
+          <a:prstGeom prst="rect">
+            <a:avLst/>
+          </a:prstGeom>
+          <a:noFill/>
+          <a:extLst>
+            <a:ext uri="{909E8E84-426E-40DD-AFC4-6F175D3DCCD1}">
+              <a14:hiddenFill xmlns:a14="http://schemas.microsoft.com/office/drawing/2010/main">
+                <a:solidFill>
+                  <a:srgbClr val="FFFFFF"/>
+                </a:solidFill>
+              </a14:hiddenFill>
+            </a:ext>
+          </a:extLst>
+        </p:spPr>
+      </p:pic>
+      <p:pic>
+        <p:nvPicPr>
+          <p:cNvPr id="6" name="Espaço Reservado para Conteúdo 5" descr="Interface gráfica do usuário, Aplicativo&#10;&#10;Descrição gerada automaticamente">
+            <a:extLst>
+              <a:ext uri="{FF2B5EF4-FFF2-40B4-BE49-F238E27FC236}">
+                <a16:creationId xmlns:a16="http://schemas.microsoft.com/office/drawing/2014/main" id="{0A4651A8-FC2E-45E7-A597-785273183F55}"/>
+              </a:ext>
+            </a:extLst>
+          </p:cNvPr>
+          <p:cNvPicPr>
+            <a:picLocks noGrp="1" noChangeAspect="1"/>
+          </p:cNvPicPr>
+          <p:nvPr>
+            <p:ph idx="1"/>
+          </p:nvPr>
+        </p:nvPicPr>
+        <p:blipFill>
+          <a:blip r:embed="rId3">
+            <a:extLst>
+              <a:ext uri="{28A0092B-C50C-407E-A947-70E740481C1C}">
+                <a14:useLocalDpi xmlns:a14="http://schemas.microsoft.com/office/drawing/2010/main" val="0"/>
+              </a:ext>
+            </a:extLst>
+          </a:blip>
+          <a:stretch>
+            <a:fillRect/>
+          </a:stretch>
+        </p:blipFill>
+        <p:spPr>
+          <a:xfrm>
+            <a:off x="955360" y="2173803"/>
+            <a:ext cx="10281279" cy="2146260"/>
+          </a:xfrm>
+        </p:spPr>
+      </p:pic>
+      <p:sp>
+        <p:nvSpPr>
+          <p:cNvPr id="2" name="Título 1">
+            <a:extLst>
+              <a:ext uri="{FF2B5EF4-FFF2-40B4-BE49-F238E27FC236}">
+                <a16:creationId xmlns:a16="http://schemas.microsoft.com/office/drawing/2014/main" id="{6E592F48-4316-496B-B8D1-65577D22ED93}"/>
+              </a:ext>
+            </a:extLst>
+          </p:cNvPr>
+          <p:cNvSpPr>
+            <a:spLocks noGrp="1"/>
+          </p:cNvSpPr>
+          <p:nvPr>
+            <p:ph type="title"/>
+          </p:nvPr>
+        </p:nvSpPr>
+        <p:spPr>
+          <a:xfrm>
+            <a:off x="1575581" y="4792705"/>
+            <a:ext cx="8412296" cy="1624660"/>
+          </a:xfrm>
+        </p:spPr>
+        <p:txBody>
+          <a:bodyPr>
+            <a:normAutofit/>
+          </a:bodyPr>
+          <a:lstStyle/>
+          <a:p>
+            <a:pPr algn="ctr"/>
+            <a:r>
+              <a:rPr lang="pt-BR" dirty="0">
+                <a:solidFill>
+                  <a:srgbClr val="030827"/>
+                </a:solidFill>
+                <a:latin typeface="Aharoni" panose="02010803020104030203" pitchFamily="2" charset="-79"/>
+                <a:cs typeface="Aharoni" panose="02010803020104030203" pitchFamily="2" charset="-79"/>
+              </a:rPr>
+              <a:t>Tabelas / modelo de dados</a:t>
+            </a:r>
+          </a:p>
+        </p:txBody>
+      </p:sp>
+      <p:sp>
+        <p:nvSpPr>
+          <p:cNvPr id="20" name="Elipse 19">
+            <a:extLst>
+              <a:ext uri="{FF2B5EF4-FFF2-40B4-BE49-F238E27FC236}">
+                <a16:creationId xmlns:a16="http://schemas.microsoft.com/office/drawing/2014/main" id="{5916C9F0-8284-46E9-8F6C-DE3C51DB637A}"/>
+              </a:ext>
+            </a:extLst>
+          </p:cNvPr>
+          <p:cNvSpPr/>
+          <p:nvPr/>
+        </p:nvSpPr>
+        <p:spPr>
+          <a:xfrm>
+            <a:off x="11581016" y="448826"/>
+            <a:ext cx="328406" cy="331768"/>
+          </a:xfrm>
+          <a:prstGeom prst="ellipse">
+            <a:avLst/>
+          </a:prstGeom>
+          <a:solidFill>
+            <a:srgbClr val="FFFFFF"/>
+          </a:solidFill>
+          <a:ln w="28575">
+            <a:solidFill>
+              <a:srgbClr val="000000"/>
+            </a:solidFill>
+          </a:ln>
+        </p:spPr>
+        <p:style>
+          <a:lnRef idx="2">
+            <a:schemeClr val="accent1">
+              <a:shade val="50000"/>
+            </a:schemeClr>
+          </a:lnRef>
+          <a:fillRef idx="1">
+            <a:schemeClr val="accent1"/>
+          </a:fillRef>
+          <a:effectRef idx="0">
+            <a:schemeClr val="accent1"/>
+          </a:effectRef>
+          <a:fontRef idx="minor">
+            <a:schemeClr val="lt1"/>
+          </a:fontRef>
+        </p:style>
+        <p:txBody>
+          <a:bodyPr rtlCol="0" anchor="ctr"/>
+          <a:lstStyle/>
+          <a:p>
+            <a:pPr algn="ctr"/>
+            <a:endParaRPr lang="pt-BR"/>
+          </a:p>
+        </p:txBody>
+      </p:sp>
+      <p:pic>
+        <p:nvPicPr>
+          <p:cNvPr id="21" name="Gráfico 20" descr="Aquário com preenchimento sólido">
+            <a:extLst>
+              <a:ext uri="{FF2B5EF4-FFF2-40B4-BE49-F238E27FC236}">
+                <a16:creationId xmlns:a16="http://schemas.microsoft.com/office/drawing/2014/main" id="{65CBB490-75B7-49D3-B94F-7F30D337C77E}"/>
+              </a:ext>
+            </a:extLst>
+          </p:cNvPr>
+          <p:cNvPicPr>
+            <a:picLocks noChangeAspect="1"/>
+          </p:cNvPicPr>
+          <p:nvPr/>
+        </p:nvPicPr>
+        <p:blipFill>
+          <a:blip r:embed="rId4">
+            <a:extLst>
+              <a:ext uri="{28A0092B-C50C-407E-A947-70E740481C1C}">
+                <a14:useLocalDpi xmlns:a14="http://schemas.microsoft.com/office/drawing/2010/main" val="0"/>
+              </a:ext>
+              <a:ext uri="{96DAC541-7B7A-43D3-8B79-37D633B846F1}">
+                <asvg:svgBlip xmlns:asvg="http://schemas.microsoft.com/office/drawing/2016/SVG/main" r:embed="rId5"/>
+              </a:ext>
+            </a:extLst>
+          </a:blip>
+          <a:stretch>
+            <a:fillRect/>
+          </a:stretch>
+        </p:blipFill>
+        <p:spPr>
+          <a:xfrm>
+            <a:off x="9677959" y="4529819"/>
+            <a:ext cx="1411979" cy="1411979"/>
+          </a:xfrm>
+          <a:prstGeom prst="rect">
+            <a:avLst/>
+          </a:prstGeom>
+        </p:spPr>
+      </p:pic>
+      <p:pic>
+        <p:nvPicPr>
+          <p:cNvPr id="22" name="Gráfico 21" descr="Aquário estrutura de tópicos">
+            <a:extLst>
+              <a:ext uri="{FF2B5EF4-FFF2-40B4-BE49-F238E27FC236}">
+                <a16:creationId xmlns:a16="http://schemas.microsoft.com/office/drawing/2014/main" id="{1E64C934-2994-4D88-95BB-825150999E8F}"/>
+              </a:ext>
+            </a:extLst>
+          </p:cNvPr>
+          <p:cNvPicPr>
+            <a:picLocks noChangeAspect="1"/>
+          </p:cNvPicPr>
+          <p:nvPr/>
+        </p:nvPicPr>
+        <p:blipFill>
+          <a:blip r:embed="rId6">
+            <a:extLst>
+              <a:ext uri="{28A0092B-C50C-407E-A947-70E740481C1C}">
+                <a14:useLocalDpi xmlns:a14="http://schemas.microsoft.com/office/drawing/2010/main" val="0"/>
+              </a:ext>
+              <a:ext uri="{96DAC541-7B7A-43D3-8B79-37D633B846F1}">
+                <asvg:svgBlip xmlns:asvg="http://schemas.microsoft.com/office/drawing/2016/SVG/main" r:embed="rId7"/>
+              </a:ext>
+            </a:extLst>
+          </a:blip>
+          <a:stretch>
+            <a:fillRect/>
+          </a:stretch>
+        </p:blipFill>
+        <p:spPr>
+          <a:xfrm>
+            <a:off x="291347" y="-391999"/>
+            <a:ext cx="2345186" cy="2345186"/>
+          </a:xfrm>
+          <a:prstGeom prst="rect">
+            <a:avLst/>
+          </a:prstGeom>
+        </p:spPr>
+      </p:pic>
+      <p:pic>
+        <p:nvPicPr>
+          <p:cNvPr id="10" name="Imagem 9" descr="Tabela&#10;&#10;Descrição gerada automaticamente">
+            <a:extLst>
+              <a:ext uri="{FF2B5EF4-FFF2-40B4-BE49-F238E27FC236}">
+                <a16:creationId xmlns:a16="http://schemas.microsoft.com/office/drawing/2014/main" id="{27BBAE55-F428-408E-8FD1-D3EAC462E992}"/>
+              </a:ext>
+            </a:extLst>
+          </p:cNvPr>
+          <p:cNvPicPr>
+            <a:picLocks noChangeAspect="1"/>
+          </p:cNvPicPr>
+          <p:nvPr/>
+        </p:nvPicPr>
+        <p:blipFill>
+          <a:blip r:embed="rId8">
+            <a:extLst>
+              <a:ext uri="{28A0092B-C50C-407E-A947-70E740481C1C}">
+                <a14:useLocalDpi xmlns:a14="http://schemas.microsoft.com/office/drawing/2010/main" val="0"/>
+              </a:ext>
+            </a:extLst>
+          </a:blip>
+          <a:stretch>
+            <a:fillRect/>
+          </a:stretch>
+        </p:blipFill>
+        <p:spPr>
+          <a:xfrm>
+            <a:off x="2855732" y="156326"/>
+            <a:ext cx="5851993" cy="1886034"/>
+          </a:xfrm>
+          <a:prstGeom prst="rect">
+            <a:avLst/>
+          </a:prstGeom>
+        </p:spPr>
+      </p:pic>
+    </p:spTree>
+    <p:extLst>
+      <p:ext uri="{BB962C8B-B14F-4D97-AF65-F5344CB8AC3E}">
+        <p14:creationId xmlns:p14="http://schemas.microsoft.com/office/powerpoint/2010/main" val="80040380"/>
+      </p:ext>
+    </p:extLst>
+  </p:cSld>
+  <p:clrMapOvr>
+    <a:masterClrMapping/>
+  </p:clrMapOvr>
+  <mc:AlternateContent xmlns:mc="http://schemas.openxmlformats.org/markup-compatibility/2006" xmlns:p14="http://schemas.microsoft.com/office/powerpoint/2010/main">
+    <mc:Choice Requires="p14">
+      <p:transition spd="slow" p14:dur="1600">
+        <p14:conveyor dir="l"/>
+      </p:transition>
+    </mc:Choice>
+    <mc:Fallback xmlns="">
+      <p:transition spd="slow">
+        <p:fade/>
+      </p:transition>
+    </mc:Fallback>
+  </mc:AlternateContent>
+  <p:timing>
+    <p:tnLst>
+      <p:par>
+        <p:cTn id="1" dur="indefinite" restart="never" nodeType="tmRoot">
+          <p:childTnLst>
+            <p:seq concurrent="1" nextAc="seek">
+              <p:cTn id="2" dur="indefinite" nodeType="mainSeq">
+                <p:childTnLst>
+                  <p:par>
+                    <p:cTn id="3" fill="hold">
+                      <p:stCondLst>
+                        <p:cond delay="indefinite"/>
+                        <p:cond evt="onBegin" delay="0">
+                          <p:tn val="2"/>
+                        </p:cond>
+                      </p:stCondLst>
+                      <p:childTnLst>
+                        <p:par>
+                          <p:cTn id="4" fill="hold">
+                            <p:stCondLst>
+                              <p:cond delay="0"/>
+                            </p:stCondLst>
+                            <p:childTnLst>
+                              <p:par>
+                                <p:cTn id="5" presetID="42" presetClass="entr" presetSubtype="0" fill="hold" nodeType="afterEffect">
+                                  <p:stCondLst>
+                                    <p:cond delay="0"/>
+                                  </p:stCondLst>
+                                  <p:childTnLst>
+                                    <p:set>
+                                      <p:cBhvr>
+                                        <p:cTn id="6" dur="1" fill="hold">
+                                          <p:stCondLst>
+                                            <p:cond delay="0"/>
+                                          </p:stCondLst>
+                                        </p:cTn>
+                                        <p:tgtEl>
+                                          <p:spTgt spid="6"/>
+                                        </p:tgtEl>
+                                        <p:attrNameLst>
+                                          <p:attrName>style.visibility</p:attrName>
+                                        </p:attrNameLst>
+                                      </p:cBhvr>
+                                      <p:to>
+                                        <p:strVal val="visible"/>
+                                      </p:to>
+                                    </p:set>
+                                    <p:animEffect transition="in" filter="fade">
+                                      <p:cBhvr>
+                                        <p:cTn id="7" dur="1000"/>
+                                        <p:tgtEl>
+                                          <p:spTgt spid="6"/>
+                                        </p:tgtEl>
+                                      </p:cBhvr>
+                                    </p:animEffect>
+                                    <p:anim calcmode="lin" valueType="num">
+                                      <p:cBhvr>
+                                        <p:cTn id="8" dur="1000" fill="hold"/>
+                                        <p:tgtEl>
+                                          <p:spTgt spid="6"/>
+                                        </p:tgtEl>
+                                        <p:attrNameLst>
+                                          <p:attrName>ppt_x</p:attrName>
+                                        </p:attrNameLst>
+                                      </p:cBhvr>
+                                      <p:tavLst>
+                                        <p:tav tm="0">
+                                          <p:val>
+                                            <p:strVal val="#ppt_x"/>
+                                          </p:val>
+                                        </p:tav>
+                                        <p:tav tm="100000">
+                                          <p:val>
+                                            <p:strVal val="#ppt_x"/>
+                                          </p:val>
+                                        </p:tav>
+                                      </p:tavLst>
+                                    </p:anim>
+                                    <p:anim calcmode="lin" valueType="num">
+                                      <p:cBhvr>
+                                        <p:cTn id="9" dur="1000" fill="hold"/>
+                                        <p:tgtEl>
+                                          <p:spTgt spid="6"/>
+                                        </p:tgtEl>
+                                        <p:attrNameLst>
+                                          <p:attrName>ppt_y</p:attrName>
+                                        </p:attrNameLst>
+                                      </p:cBhvr>
+                                      <p:tavLst>
+                                        <p:tav tm="0">
+                                          <p:val>
+                                            <p:strVal val="#ppt_y+.1"/>
+                                          </p:val>
+                                        </p:tav>
+                                        <p:tav tm="100000">
+                                          <p:val>
+                                            <p:strVal val="#ppt_y"/>
+                                          </p:val>
+                                        </p:tav>
+                                      </p:tavLst>
+                                    </p:anim>
+                                  </p:childTnLst>
+                                </p:cTn>
+                              </p:par>
+                            </p:childTnLst>
+                          </p:cTn>
+                        </p:par>
+                        <p:par>
+                          <p:cTn id="10" fill="hold">
+                            <p:stCondLst>
+                              <p:cond delay="1000"/>
+                            </p:stCondLst>
+                            <p:childTnLst>
+                              <p:par>
+                                <p:cTn id="11" presetID="42" presetClass="entr" presetSubtype="0" fill="hold" grpId="0" nodeType="afterEffect">
+                                  <p:stCondLst>
+                                    <p:cond delay="0"/>
+                                  </p:stCondLst>
+                                  <p:childTnLst>
+                                    <p:set>
+                                      <p:cBhvr>
+                                        <p:cTn id="12" dur="1" fill="hold">
+                                          <p:stCondLst>
+                                            <p:cond delay="0"/>
+                                          </p:stCondLst>
+                                        </p:cTn>
+                                        <p:tgtEl>
+                                          <p:spTgt spid="2"/>
+                                        </p:tgtEl>
+                                        <p:attrNameLst>
+                                          <p:attrName>style.visibility</p:attrName>
+                                        </p:attrNameLst>
+                                      </p:cBhvr>
+                                      <p:to>
+                                        <p:strVal val="visible"/>
+                                      </p:to>
+                                    </p:set>
+                                    <p:animEffect transition="in" filter="fade">
+                                      <p:cBhvr>
+                                        <p:cTn id="13" dur="1000"/>
+                                        <p:tgtEl>
+                                          <p:spTgt spid="2"/>
+                                        </p:tgtEl>
+                                      </p:cBhvr>
+                                    </p:animEffect>
+                                    <p:anim calcmode="lin" valueType="num">
+                                      <p:cBhvr>
+                                        <p:cTn id="14" dur="1000" fill="hold"/>
+                                        <p:tgtEl>
+                                          <p:spTgt spid="2"/>
+                                        </p:tgtEl>
+                                        <p:attrNameLst>
+                                          <p:attrName>ppt_x</p:attrName>
+                                        </p:attrNameLst>
+                                      </p:cBhvr>
+                                      <p:tavLst>
+                                        <p:tav tm="0">
+                                          <p:val>
+                                            <p:strVal val="#ppt_x"/>
+                                          </p:val>
+                                        </p:tav>
+                                        <p:tav tm="100000">
+                                          <p:val>
+                                            <p:strVal val="#ppt_x"/>
+                                          </p:val>
+                                        </p:tav>
+                                      </p:tavLst>
+                                    </p:anim>
+                                    <p:anim calcmode="lin" valueType="num">
+                                      <p:cBhvr>
+                                        <p:cTn id="15" dur="1000" fill="hold"/>
+                                        <p:tgtEl>
+                                          <p:spTgt spid="2"/>
+                                        </p:tgtEl>
+                                        <p:attrNameLst>
+                                          <p:attrName>ppt_y</p:attrName>
+                                        </p:attrNameLst>
+                                      </p:cBhvr>
+                                      <p:tavLst>
+                                        <p:tav tm="0">
+                                          <p:val>
+                                            <p:strVal val="#ppt_y+.1"/>
+                                          </p:val>
+                                        </p:tav>
+                                        <p:tav tm="100000">
+                                          <p:val>
+                                            <p:strVal val="#ppt_y"/>
+                                          </p:val>
+                                        </p:tav>
+                                      </p:tavLst>
+                                    </p:anim>
+                                  </p:childTnLst>
+                                </p:cTn>
+                              </p:par>
+                            </p:childTnLst>
+                          </p:cTn>
+                        </p:par>
+                      </p:childTnLst>
+                    </p:cTn>
+                  </p:par>
+                </p:childTnLst>
+              </p:cTn>
+              <p:prevCondLst>
+                <p:cond evt="onPrev" delay="0">
+                  <p:tgtEl>
+                    <p:sldTgt/>
+                  </p:tgtEl>
+                </p:cond>
+              </p:prevCondLst>
+              <p:nextCondLst>
+                <p:cond evt="onNext" delay="0">
+                  <p:tgtEl>
+                    <p:sldTgt/>
+                  </p:tgtEl>
+                </p:cond>
+              </p:nextCondLst>
+            </p:seq>
+          </p:childTnLst>
+        </p:cTn>
+      </p:par>
+    </p:tnLst>
+    <p:bldLst>
+      <p:bldP spid="2" grpId="0"/>
+    </p:bldLst>
   </p:timing>
 </p:sld>
 </file>

</xml_diff>